<commit_message>
updated with frequency band plots
</commit_message>
<xml_diff>
--- a/Epileptic Seizure Recognition_Ver02.pptx
+++ b/Epileptic Seizure Recognition_Ver02.pptx
@@ -5,10 +5,10 @@
     <p:sldMasterId id="2147483648" r:id="rId4"/>
   </p:sldMasterIdLst>
   <p:notesMasterIdLst>
-    <p:notesMasterId r:id="rId12"/>
+    <p:notesMasterId r:id="rId13"/>
   </p:notesMasterIdLst>
   <p:handoutMasterIdLst>
-    <p:handoutMasterId r:id="rId13"/>
+    <p:handoutMasterId r:id="rId14"/>
   </p:handoutMasterIdLst>
   <p:sldIdLst>
     <p:sldId id="256" r:id="rId5"/>
@@ -17,7 +17,8 @@
     <p:sldId id="290" r:id="rId8"/>
     <p:sldId id="286" r:id="rId9"/>
     <p:sldId id="291" r:id="rId10"/>
-    <p:sldId id="289" r:id="rId11"/>
+    <p:sldId id="292" r:id="rId11"/>
+    <p:sldId id="289" r:id="rId12"/>
   </p:sldIdLst>
   <p:sldSz cx="12192000" cy="6858000"/>
   <p:notesSz cx="6858000" cy="9144000"/>
@@ -241,7 +242,7 @@
           <a:p>
             <a:fld id="{B56F32FC-4BD9-442A-A8C6-51598C909FE3}" type="datetimeFigureOut">
               <a:rPr lang="en-US" smtClean="0"/>
-              <a:t>11/10/24</a:t>
+              <a:t>11/13/24</a:t>
             </a:fld>
             <a:endParaRPr lang="en-US" dirty="0"/>
           </a:p>
@@ -418,7 +419,7 @@
           <a:p>
             <a:fld id="{056371FA-A98D-41E8-93F4-09945841298A}" type="datetimeFigureOut">
               <a:rPr lang="en-US" smtClean="0"/>
-              <a:t>11/10/24</a:t>
+              <a:t>11/13/24</a:t>
             </a:fld>
             <a:endParaRPr lang="en-US" dirty="0"/>
           </a:p>
@@ -1218,6 +1219,90 @@
   <p:cSld>
     <p:spTree>
       <p:nvGrpSpPr>
+        <p:cNvPr id="1" name=""/>
+        <p:cNvGrpSpPr/>
+        <p:nvPr/>
+      </p:nvGrpSpPr>
+      <p:grpSpPr>
+        <a:xfrm>
+          <a:off x="0" y="0"/>
+          <a:ext cx="0" cy="0"/>
+          <a:chOff x="0" y="0"/>
+          <a:chExt cx="0" cy="0"/>
+        </a:xfrm>
+      </p:grpSpPr>
+      <p:sp>
+        <p:nvSpPr>
+          <p:cNvPr id="2" name="Slide Image Placeholder 1"/>
+          <p:cNvSpPr>
+            <a:spLocks noGrp="1" noRot="1" noChangeAspect="1"/>
+          </p:cNvSpPr>
+          <p:nvPr>
+            <p:ph type="sldImg"/>
+          </p:nvPr>
+        </p:nvSpPr>
+        <p:spPr/>
+      </p:sp>
+      <p:sp>
+        <p:nvSpPr>
+          <p:cNvPr id="3" name="Notes Placeholder 2"/>
+          <p:cNvSpPr>
+            <a:spLocks noGrp="1"/>
+          </p:cNvSpPr>
+          <p:nvPr>
+            <p:ph type="body" idx="1"/>
+          </p:nvPr>
+        </p:nvSpPr>
+        <p:spPr/>
+        <p:txBody>
+          <a:bodyPr/>
+          <a:lstStyle/>
+          <a:p>
+            <a:endParaRPr lang="en-US" dirty="0"/>
+          </a:p>
+        </p:txBody>
+      </p:sp>
+      <p:sp>
+        <p:nvSpPr>
+          <p:cNvPr id="4" name="Slide Number Placeholder 3"/>
+          <p:cNvSpPr>
+            <a:spLocks noGrp="1"/>
+          </p:cNvSpPr>
+          <p:nvPr>
+            <p:ph type="sldNum" sz="quarter" idx="5"/>
+          </p:nvPr>
+        </p:nvSpPr>
+        <p:spPr/>
+        <p:txBody>
+          <a:bodyPr/>
+          <a:lstStyle/>
+          <a:p>
+            <a:fld id="{22289C57-55D7-40A4-A101-E74FAC7A092B}" type="slidenum">
+              <a:rPr lang="en-US" smtClean="0"/>
+              <a:t>7</a:t>
+            </a:fld>
+            <a:endParaRPr lang="en-US" dirty="0"/>
+          </a:p>
+        </p:txBody>
+      </p:sp>
+    </p:spTree>
+    <p:extLst>
+      <p:ext uri="{BB962C8B-B14F-4D97-AF65-F5344CB8AC3E}">
+        <p14:creationId xmlns:p14="http://schemas.microsoft.com/office/powerpoint/2010/main" val="1447077352"/>
+      </p:ext>
+    </p:extLst>
+  </p:cSld>
+  <p:clrMapOvr>
+    <a:masterClrMapping/>
+  </p:clrMapOvr>
+</p:notes>
+</file>
+
+<file path=ppt/notesSlides/notesSlide8.xml><?xml version="1.0" encoding="utf-8"?>
+<p:notes xmlns:a="http://schemas.openxmlformats.org/drawingml/2006/main" xmlns:r="http://schemas.openxmlformats.org/officeDocument/2006/relationships" xmlns:p="http://schemas.openxmlformats.org/presentationml/2006/main">
+  <p:cSld>
+    <p:spTree>
+      <p:nvGrpSpPr>
         <p:cNvPr id="1" name="">
           <a:extLst>
             <a:ext uri="{FF2B5EF4-FFF2-40B4-BE49-F238E27FC236}">
@@ -1302,7 +1387,7 @@
           <a:p>
             <a:fld id="{22289C57-55D7-40A4-A101-E74FAC7A092B}" type="slidenum">
               <a:rPr lang="en-US" smtClean="0"/>
-              <a:t>7</a:t>
+              <a:t>8</a:t>
             </a:fld>
             <a:endParaRPr lang="en-US" dirty="0"/>
           </a:p>
@@ -7988,6 +8073,375 @@
   <p:cSld>
     <p:spTree>
       <p:nvGrpSpPr>
+        <p:cNvPr id="1" name=""/>
+        <p:cNvGrpSpPr/>
+        <p:nvPr/>
+      </p:nvGrpSpPr>
+      <p:grpSpPr>
+        <a:xfrm>
+          <a:off x="0" y="0"/>
+          <a:ext cx="0" cy="0"/>
+          <a:chOff x="0" y="0"/>
+          <a:chExt cx="0" cy="0"/>
+        </a:xfrm>
+      </p:grpSpPr>
+      <p:sp>
+        <p:nvSpPr>
+          <p:cNvPr id="2" name="Title 1">
+            <a:extLst>
+              <a:ext uri="{FF2B5EF4-FFF2-40B4-BE49-F238E27FC236}">
+                <a16:creationId xmlns:a16="http://schemas.microsoft.com/office/drawing/2014/main" id="{248B267E-B765-D68F-968F-096D890F8A92}"/>
+              </a:ext>
+            </a:extLst>
+          </p:cNvPr>
+          <p:cNvSpPr>
+            <a:spLocks noGrp="1"/>
+          </p:cNvSpPr>
+          <p:nvPr>
+            <p:ph type="title"/>
+          </p:nvPr>
+        </p:nvSpPr>
+        <p:spPr>
+          <a:xfrm>
+            <a:off x="991311" y="-1296825"/>
+            <a:ext cx="7288282" cy="2121177"/>
+          </a:xfrm>
+        </p:spPr>
+        <p:txBody>
+          <a:bodyPr/>
+          <a:lstStyle/>
+          <a:p>
+            <a:r>
+              <a:rPr lang="en-US" dirty="0"/>
+              <a:t>Data Exploration Insights</a:t>
+            </a:r>
+          </a:p>
+        </p:txBody>
+      </p:sp>
+      <p:sp>
+        <p:nvSpPr>
+          <p:cNvPr id="4" name="Slide Number Placeholder 3">
+            <a:extLst>
+              <a:ext uri="{FF2B5EF4-FFF2-40B4-BE49-F238E27FC236}">
+                <a16:creationId xmlns:a16="http://schemas.microsoft.com/office/drawing/2014/main" id="{FEA7F587-F0C8-BA7D-22EA-8EB8E0AA565E}"/>
+              </a:ext>
+            </a:extLst>
+          </p:cNvPr>
+          <p:cNvSpPr>
+            <a:spLocks noGrp="1"/>
+          </p:cNvSpPr>
+          <p:nvPr>
+            <p:ph type="sldNum" sz="quarter" idx="12"/>
+          </p:nvPr>
+        </p:nvSpPr>
+        <p:spPr>
+          <a:xfrm>
+            <a:off x="10227046" y="5871992"/>
+            <a:ext cx="987552" cy="365125"/>
+          </a:xfrm>
+        </p:spPr>
+        <p:txBody>
+          <a:bodyPr/>
+          <a:lstStyle/>
+          <a:p>
+            <a:fld id="{A49DFD55-3C28-40EF-9E31-A92D2E4017FF}" type="slidenum">
+              <a:rPr lang="en-US" smtClean="0"/>
+              <a:pPr/>
+              <a:t>7</a:t>
+            </a:fld>
+            <a:endParaRPr lang="en-US" dirty="0"/>
+          </a:p>
+        </p:txBody>
+      </p:sp>
+      <p:sp>
+        <p:nvSpPr>
+          <p:cNvPr id="7" name="TextBox 6">
+            <a:extLst>
+              <a:ext uri="{FF2B5EF4-FFF2-40B4-BE49-F238E27FC236}">
+                <a16:creationId xmlns:a16="http://schemas.microsoft.com/office/drawing/2014/main" id="{CC3367EC-F890-BAEC-694C-48D8206146D0}"/>
+              </a:ext>
+            </a:extLst>
+          </p:cNvPr>
+          <p:cNvSpPr txBox="1"/>
+          <p:nvPr/>
+        </p:nvSpPr>
+        <p:spPr>
+          <a:xfrm>
+            <a:off x="645405" y="848208"/>
+            <a:ext cx="7288282" cy="1323439"/>
+          </a:xfrm>
+          <a:prstGeom prst="rect">
+            <a:avLst/>
+          </a:prstGeom>
+          <a:noFill/>
+        </p:spPr>
+        <p:txBody>
+          <a:bodyPr wrap="square" rtlCol="0">
+            <a:spAutoFit/>
+          </a:bodyPr>
+          <a:lstStyle/>
+          <a:p>
+            <a:r>
+              <a:rPr lang="en-US" sz="1600" dirty="0"/>
+              <a:t>The plot below shows frequency band analysis of EEG signals, breaking down brain activity into different frequency ranges (Delta: 0-4 Hz, Theta: 4-8 Hz, Alpha: 8-13 Hz, Beta: 13-30 Hz, and Gamma: &gt;30 Hz), where each band represents distinct types of brain activity, allowing us to analyze how the distribution of these frequencies differs between seizure and non-seizure states.</a:t>
+            </a:r>
+          </a:p>
+        </p:txBody>
+      </p:sp>
+      <p:sp>
+        <p:nvSpPr>
+          <p:cNvPr id="13" name="TextBox 12">
+            <a:extLst>
+              <a:ext uri="{FF2B5EF4-FFF2-40B4-BE49-F238E27FC236}">
+                <a16:creationId xmlns:a16="http://schemas.microsoft.com/office/drawing/2014/main" id="{81915EE3-E26E-7C4F-86FA-A98D0610DD54}"/>
+              </a:ext>
+            </a:extLst>
+          </p:cNvPr>
+          <p:cNvSpPr txBox="1"/>
+          <p:nvPr/>
+        </p:nvSpPr>
+        <p:spPr>
+          <a:xfrm>
+            <a:off x="8060565" y="4281438"/>
+            <a:ext cx="3385959" cy="2246769"/>
+          </a:xfrm>
+          <a:prstGeom prst="rect">
+            <a:avLst/>
+          </a:prstGeom>
+          <a:noFill/>
+        </p:spPr>
+        <p:txBody>
+          <a:bodyPr wrap="square" rtlCol="0">
+            <a:spAutoFit/>
+          </a:bodyPr>
+          <a:lstStyle/>
+          <a:p>
+            <a:endParaRPr lang="en-US" sz="1400" b="1" dirty="0"/>
+          </a:p>
+          <a:p>
+            <a:r>
+              <a:rPr lang="en-US" sz="1400" b="1" dirty="0"/>
+              <a:t>Figure 2: </a:t>
+            </a:r>
+            <a:r>
+              <a:rPr lang="en-US" sz="1400" dirty="0"/>
+              <a:t>Comparison of power distribution across EEG frequency bands between seizure and non-seizure states, showing the normalized power (%) for each frequency band. The analysis reveals distinctive patterns in frequency distribution, particularly in the Theta Band which could serve as discriminative features for seizure detection.</a:t>
+            </a:r>
+          </a:p>
+        </p:txBody>
+      </p:sp>
+      <p:pic>
+        <p:nvPicPr>
+          <p:cNvPr id="3" name="Picture 2">
+            <a:extLst>
+              <a:ext uri="{FF2B5EF4-FFF2-40B4-BE49-F238E27FC236}">
+                <a16:creationId xmlns:a16="http://schemas.microsoft.com/office/drawing/2014/main" id="{9BCF3690-7132-AC3B-586D-46B83EEE6961}"/>
+              </a:ext>
+            </a:extLst>
+          </p:cNvPr>
+          <p:cNvPicPr>
+            <a:picLocks noChangeAspect="1"/>
+          </p:cNvPicPr>
+          <p:nvPr/>
+        </p:nvPicPr>
+        <p:blipFill>
+          <a:blip r:embed="rId3"/>
+          <a:stretch>
+            <a:fillRect/>
+          </a:stretch>
+        </p:blipFill>
+        <p:spPr>
+          <a:xfrm>
+            <a:off x="770971" y="2289491"/>
+            <a:ext cx="6923183" cy="3961860"/>
+          </a:xfrm>
+          <a:prstGeom prst="rect">
+            <a:avLst/>
+          </a:prstGeom>
+        </p:spPr>
+      </p:pic>
+      <p:sp>
+        <p:nvSpPr>
+          <p:cNvPr id="6" name="TextBox 5">
+            <a:extLst>
+              <a:ext uri="{FF2B5EF4-FFF2-40B4-BE49-F238E27FC236}">
+                <a16:creationId xmlns:a16="http://schemas.microsoft.com/office/drawing/2014/main" id="{B5E58CE8-F8DD-EC56-948C-25C4F31E6E15}"/>
+              </a:ext>
+            </a:extLst>
+          </p:cNvPr>
+          <p:cNvSpPr txBox="1"/>
+          <p:nvPr/>
+        </p:nvSpPr>
+        <p:spPr>
+          <a:xfrm>
+            <a:off x="8137684" y="587832"/>
+            <a:ext cx="3565623" cy="3939540"/>
+          </a:xfrm>
+          <a:prstGeom prst="rect">
+            <a:avLst/>
+          </a:prstGeom>
+          <a:noFill/>
+        </p:spPr>
+        <p:txBody>
+          <a:bodyPr wrap="square" rtlCol="0">
+            <a:spAutoFit/>
+          </a:bodyPr>
+          <a:lstStyle/>
+          <a:p>
+            <a:r>
+              <a:rPr lang="en-US" sz="1000" b="1" dirty="0"/>
+              <a:t>Delta Band:</a:t>
+            </a:r>
+          </a:p>
+          <a:p>
+            <a:r>
+              <a:rPr lang="en-US" sz="1000" b="1" dirty="0"/>
+              <a:t>T-statistic: 5.80</a:t>
+            </a:r>
+          </a:p>
+          <a:p>
+            <a:r>
+              <a:rPr lang="en-US" sz="1000" b="1" dirty="0"/>
+              <a:t>P-value: 0.0000</a:t>
+            </a:r>
+          </a:p>
+          <a:p>
+            <a:r>
+              <a:rPr lang="en-US" sz="1000" b="1" dirty="0"/>
+              <a:t>Absolute difference: 37.84%</a:t>
+            </a:r>
+          </a:p>
+          <a:p>
+            <a:endParaRPr lang="en-US" sz="1000" b="1" dirty="0"/>
+          </a:p>
+          <a:p>
+            <a:r>
+              <a:rPr lang="en-US" sz="1000" b="1" dirty="0"/>
+              <a:t>Theta Band:</a:t>
+            </a:r>
+          </a:p>
+          <a:p>
+            <a:r>
+              <a:rPr lang="en-US" sz="1000" b="1" dirty="0"/>
+              <a:t>T-statistic: 7.44</a:t>
+            </a:r>
+          </a:p>
+          <a:p>
+            <a:r>
+              <a:rPr lang="en-US" sz="1000" b="1" dirty="0"/>
+              <a:t>P-value: 0.0000</a:t>
+            </a:r>
+          </a:p>
+          <a:p>
+            <a:r>
+              <a:rPr lang="en-US" sz="1000" b="1" dirty="0"/>
+              <a:t>Absolute difference: 87.53%</a:t>
+            </a:r>
+          </a:p>
+          <a:p>
+            <a:endParaRPr lang="en-US" sz="1000" b="1" dirty="0"/>
+          </a:p>
+          <a:p>
+            <a:r>
+              <a:rPr lang="en-US" sz="1000" b="1" dirty="0"/>
+              <a:t>Alpha Band:</a:t>
+            </a:r>
+          </a:p>
+          <a:p>
+            <a:r>
+              <a:rPr lang="en-US" sz="1000" b="1" dirty="0"/>
+              <a:t>T-statistic: 7.82</a:t>
+            </a:r>
+          </a:p>
+          <a:p>
+            <a:r>
+              <a:rPr lang="en-US" sz="1000" b="1" dirty="0"/>
+              <a:t>P-value: 0.0000</a:t>
+            </a:r>
+          </a:p>
+          <a:p>
+            <a:r>
+              <a:rPr lang="en-US" sz="1000" b="1" dirty="0"/>
+              <a:t>Absolute difference: 23.67%</a:t>
+            </a:r>
+          </a:p>
+          <a:p>
+            <a:endParaRPr lang="en-US" sz="1000" b="1" dirty="0"/>
+          </a:p>
+          <a:p>
+            <a:r>
+              <a:rPr lang="en-US" sz="1000" b="1" dirty="0"/>
+              <a:t>Beta Band:</a:t>
+            </a:r>
+          </a:p>
+          <a:p>
+            <a:r>
+              <a:rPr lang="en-US" sz="1000" b="1" dirty="0"/>
+              <a:t>T-statistic: 6.00</a:t>
+            </a:r>
+          </a:p>
+          <a:p>
+            <a:r>
+              <a:rPr lang="en-US" sz="1000" b="1" dirty="0"/>
+              <a:t>P-value: 0.0000</a:t>
+            </a:r>
+          </a:p>
+          <a:p>
+            <a:r>
+              <a:rPr lang="en-US" sz="1000" b="1" dirty="0"/>
+              <a:t>Absolute difference: 17.39%</a:t>
+            </a:r>
+          </a:p>
+          <a:p>
+            <a:endParaRPr lang="en-US" sz="1000" b="1" dirty="0"/>
+          </a:p>
+          <a:p>
+            <a:r>
+              <a:rPr lang="en-US" sz="1000" b="1" dirty="0"/>
+              <a:t>Gamma Band:</a:t>
+            </a:r>
+          </a:p>
+          <a:p>
+            <a:r>
+              <a:rPr lang="en-US" sz="1000" b="1" dirty="0"/>
+              <a:t>T-statistic: 5.56</a:t>
+            </a:r>
+          </a:p>
+          <a:p>
+            <a:r>
+              <a:rPr lang="en-US" sz="1000" b="1" dirty="0"/>
+              <a:t>P-value: 0.0000</a:t>
+            </a:r>
+          </a:p>
+          <a:p>
+            <a:r>
+              <a:rPr lang="en-US" sz="1000" b="1" dirty="0"/>
+              <a:t>Absolute difference: 0.12%</a:t>
+            </a:r>
+          </a:p>
+          <a:p>
+            <a:endParaRPr lang="en-US" sz="1000" dirty="0"/>
+          </a:p>
+        </p:txBody>
+      </p:sp>
+    </p:spTree>
+    <p:extLst>
+      <p:ext uri="{BB962C8B-B14F-4D97-AF65-F5344CB8AC3E}">
+        <p14:creationId xmlns:p14="http://schemas.microsoft.com/office/powerpoint/2010/main" val="52365128"/>
+      </p:ext>
+    </p:extLst>
+  </p:cSld>
+  <p:clrMapOvr>
+    <a:masterClrMapping/>
+  </p:clrMapOvr>
+</p:sld>
+</file>
+
+<file path=ppt/slides/slide8.xml><?xml version="1.0" encoding="utf-8"?>
+<p:sld xmlns:a="http://schemas.openxmlformats.org/drawingml/2006/main" xmlns:r="http://schemas.openxmlformats.org/officeDocument/2006/relationships" xmlns:p="http://schemas.openxmlformats.org/presentationml/2006/main">
+  <p:cSld>
+    <p:spTree>
+      <p:nvGrpSpPr>
         <p:cNvPr id="1" name="">
           <a:extLst>
             <a:ext uri="{FF2B5EF4-FFF2-40B4-BE49-F238E27FC236}">
@@ -8153,7 +8607,7 @@
             <a:fld id="{A49DFD55-3C28-40EF-9E31-A92D2E4017FF}" type="slidenum">
               <a:rPr lang="en-US" smtClean="0"/>
               <a:pPr/>
-              <a:t>7</a:t>
+              <a:t>8</a:t>
             </a:fld>
             <a:endParaRPr lang="en-US" dirty="0"/>
           </a:p>
@@ -8964,15 +9418,6 @@
 </file>
 
 <file path=customXml/item1.xml><?xml version="1.0" encoding="utf-8"?>
-<?mso-contentType ?>
-<FormTemplates xmlns="http://schemas.microsoft.com/sharepoint/v3/contenttype/forms">
-  <Display>DocumentLibraryForm</Display>
-  <Edit>DocumentLibraryForm</Edit>
-  <New>DocumentLibraryForm</New>
-</FormTemplates>
-</file>
-
-<file path=customXml/item2.xml><?xml version="1.0" encoding="utf-8"?>
 <p:properties xmlns:p="http://schemas.microsoft.com/office/2006/metadata/properties" xmlns:xsi="http://www.w3.org/2001/XMLSchema-instance" xmlns:pc="http://schemas.microsoft.com/office/infopath/2007/PartnerControls">
   <documentManagement>
     <_ip_UnifiedCompliancePolicyUIAction xmlns="http://schemas.microsoft.com/sharepoint/v3" xsi:nil="true"/>
@@ -8990,6 +9435,15 @@
     <MediaServiceKeyPoints xmlns="71af3243-3dd4-4a8d-8c0d-dd76da1f02a5" xsi:nil="true"/>
   </documentManagement>
 </p:properties>
+</file>
+
+<file path=customXml/item2.xml><?xml version="1.0" encoding="utf-8"?>
+<?mso-contentType ?>
+<FormTemplates xmlns="http://schemas.microsoft.com/sharepoint/v3/contenttype/forms">
+  <Display>DocumentLibraryForm</Display>
+  <Edit>DocumentLibraryForm</Edit>
+  <New>DocumentLibraryForm</New>
+</FormTemplates>
 </file>
 
 <file path=customXml/item3.xml><?xml version="1.0" encoding="utf-8"?>
@@ -9305,14 +9759,6 @@
 </file>
 
 <file path=customXml/itemProps1.xml><?xml version="1.0" encoding="utf-8"?>
-<ds:datastoreItem xmlns:ds="http://schemas.openxmlformats.org/officeDocument/2006/customXml" ds:itemID="{CABF691C-888B-4061-8A6F-D5CE84A0254B}">
-  <ds:schemaRefs>
-    <ds:schemaRef ds:uri="http://schemas.microsoft.com/sharepoint/v3/contenttype/forms"/>
-  </ds:schemaRefs>
-</ds:datastoreItem>
-</file>
-
-<file path=customXml/itemProps2.xml><?xml version="1.0" encoding="utf-8"?>
 <ds:datastoreItem xmlns:ds="http://schemas.openxmlformats.org/officeDocument/2006/customXml" ds:itemID="{49168DCE-134F-4610-A6AA-88CEBE8D71D2}">
   <ds:schemaRefs>
     <ds:schemaRef ds:uri="http://schemas.microsoft.com/office/2006/metadata/properties"/>
@@ -9320,6 +9766,14 @@
     <ds:schemaRef ds:uri="http://schemas.microsoft.com/sharepoint/v3"/>
     <ds:schemaRef ds:uri="71af3243-3dd4-4a8d-8c0d-dd76da1f02a5"/>
     <ds:schemaRef ds:uri="230e9df3-be65-4c73-a93b-d1236ebd677e"/>
+  </ds:schemaRefs>
+</ds:datastoreItem>
+</file>
+
+<file path=customXml/itemProps2.xml><?xml version="1.0" encoding="utf-8"?>
+<ds:datastoreItem xmlns:ds="http://schemas.openxmlformats.org/officeDocument/2006/customXml" ds:itemID="{CABF691C-888B-4061-8A6F-D5CE84A0254B}">
+  <ds:schemaRefs>
+    <ds:schemaRef ds:uri="http://schemas.microsoft.com/sharepoint/v3/contenttype/forms"/>
   </ds:schemaRefs>
 </ds:datastoreItem>
 </file>

</xml_diff>

<commit_message>
updated frequency band visual
</commit_message>
<xml_diff>
--- a/Epileptic Seizure Recognition_Ver02.pptx
+++ b/Epileptic Seizure Recognition_Ver02.pptx
@@ -8202,7 +8202,7 @@
         </p:nvSpPr>
         <p:spPr>
           <a:xfrm>
-            <a:off x="8060565" y="4281438"/>
+            <a:off x="8038531" y="3994996"/>
             <a:ext cx="3385959" cy="2246769"/>
           </a:xfrm>
           <a:prstGeom prst="rect">
@@ -8275,7 +8275,7 @@
         <p:spPr>
           <a:xfrm>
             <a:off x="8137684" y="587832"/>
-            <a:ext cx="3565623" cy="3939540"/>
+            <a:ext cx="3565623" cy="3170099"/>
           </a:xfrm>
           <a:prstGeom prst="rect">
             <a:avLst/>
@@ -8302,12 +8302,6 @@
           <a:p>
             <a:r>
               <a:rPr lang="en-US" sz="1000" b="1" dirty="0"/>
-              <a:t>P-value: 0.0000</a:t>
-            </a:r>
-          </a:p>
-          <a:p>
-            <a:r>
-              <a:rPr lang="en-US" sz="1000" b="1" dirty="0"/>
               <a:t>Absolute difference: 37.84%</a:t>
             </a:r>
           </a:p>
@@ -8329,12 +8323,6 @@
           <a:p>
             <a:r>
               <a:rPr lang="en-US" sz="1000" b="1" dirty="0"/>
-              <a:t>P-value: 0.0000</a:t>
-            </a:r>
-          </a:p>
-          <a:p>
-            <a:r>
-              <a:rPr lang="en-US" sz="1000" b="1" dirty="0"/>
               <a:t>Absolute difference: 87.53%</a:t>
             </a:r>
           </a:p>
@@ -8356,12 +8344,6 @@
           <a:p>
             <a:r>
               <a:rPr lang="en-US" sz="1000" b="1" dirty="0"/>
-              <a:t>P-value: 0.0000</a:t>
-            </a:r>
-          </a:p>
-          <a:p>
-            <a:r>
-              <a:rPr lang="en-US" sz="1000" b="1" dirty="0"/>
               <a:t>Absolute difference: 23.67%</a:t>
             </a:r>
           </a:p>
@@ -8383,12 +8365,6 @@
           <a:p>
             <a:r>
               <a:rPr lang="en-US" sz="1000" b="1" dirty="0"/>
-              <a:t>P-value: 0.0000</a:t>
-            </a:r>
-          </a:p>
-          <a:p>
-            <a:r>
-              <a:rPr lang="en-US" sz="1000" b="1" dirty="0"/>
               <a:t>Absolute difference: 17.39%</a:t>
             </a:r>
           </a:p>
@@ -8405,12 +8381,6 @@
             <a:r>
               <a:rPr lang="en-US" sz="1000" b="1" dirty="0"/>
               <a:t>T-statistic: 5.56</a:t>
-            </a:r>
-          </a:p>
-          <a:p>
-            <a:r>
-              <a:rPr lang="en-US" sz="1000" b="1" dirty="0"/>
-              <a:t>P-value: 0.0000</a:t>
             </a:r>
           </a:p>
           <a:p>

</xml_diff>